<commit_message>
added PDF, deleted methodikpipeline
</commit_message>
<xml_diff>
--- a/EDBVPRAESI.pptx
+++ b/EDBVPRAESI.pptx
@@ -10,10 +10,9 @@
     <p:sldId id="256" r:id="rId4"/>
     <p:sldId id="257" r:id="rId5"/>
     <p:sldId id="258" r:id="rId6"/>
-    <p:sldId id="259" r:id="rId7"/>
-    <p:sldId id="260" r:id="rId8"/>
-    <p:sldId id="261" r:id="rId9"/>
-    <p:sldId id="262" r:id="rId10"/>
+    <p:sldId id="260" r:id="rId7"/>
+    <p:sldId id="261" r:id="rId8"/>
+    <p:sldId id="262" r:id="rId9"/>
   </p:sldIdLst>
   <p:sldSz cx="12192000" cy="6858000"/>
   <p:notesSz cx="7772400" cy="10058400"/>
@@ -112,6 +111,11 @@
       </a:defRPr>
     </a:lvl9pPr>
   </p:defaultTextStyle>
+  <p:extLst>
+    <p:ext uri="{EFAFB233-063F-42B5-8137-9DF3F51BA10A}">
+      <p15:sldGuideLst xmlns:p15="http://schemas.microsoft.com/office/powerpoint/2012/main"/>
+    </p:ext>
+  </p:extLst>
 </p:presentation>
 </file>
 
@@ -4952,7 +4956,7 @@
                 </a:uFill>
                 <a:latin typeface="Calibri"/>
               </a:rPr>
-              <a:t>12/1/2019</a:t>
+              <a:t>12/1/19</a:t>
             </a:fld>
             <a:endParaRPr lang="en-US" sz="1200" b="0" strike="noStrike" spc="-1">
               <a:solidFill>
@@ -5866,7 +5870,7 @@
                 </a:uFill>
                 <a:latin typeface="Calibri"/>
               </a:rPr>
-              <a:t>12/1/2019</a:t>
+              <a:t>12/1/19</a:t>
             </a:fld>
             <a:endParaRPr lang="en-US" sz="1200" b="0" strike="noStrike" spc="-1">
               <a:solidFill>
@@ -6734,7 +6738,7 @@
                 </a:uFill>
                 <a:latin typeface="Calibri"/>
               </a:rPr>
-              <a:t>12/1/2019</a:t>
+              <a:t>12/1/19</a:t>
             </a:fld>
             <a:endParaRPr lang="en-US" sz="1200" b="0" strike="noStrike" spc="-1">
               <a:solidFill>
@@ -7879,7 +7883,7 @@
       </p:grpSpPr>
       <p:sp>
         <p:nvSpPr>
-          <p:cNvPr id="125" name="TextShape 1"/>
+          <p:cNvPr id="127" name="TextShape 1"/>
           <p:cNvSpPr txBox="1"/>
           <p:nvPr/>
         </p:nvSpPr>
@@ -7917,7 +7921,7 @@
                 </a:uFill>
                 <a:latin typeface="Calibri Light"/>
               </a:rPr>
-              <a:t>Methodiken</a:t>
+              <a:t>Aktueller Stand</a:t>
             </a:r>
             <a:endParaRPr lang="de-DE" sz="4400" b="0" strike="noStrike" spc="-1">
               <a:solidFill>
@@ -7933,15 +7937,38 @@
           </a:p>
         </p:txBody>
       </p:sp>
-      <p:sp>
-        <p:nvSpPr>
-          <p:cNvPr id="126" name="TextShape 2"/>
+      <p:pic>
+        <p:nvPicPr>
+          <p:cNvPr id="128" name="Grafik 127"/>
+          <p:cNvPicPr/>
+          <p:nvPr/>
+        </p:nvPicPr>
+        <p:blipFill>
+          <a:blip r:embed="rId2"/>
+          <a:stretch/>
+        </p:blipFill>
+        <p:spPr>
+          <a:xfrm>
+            <a:off x="5212080" y="2960640"/>
+            <a:ext cx="6583680" cy="3440160"/>
+          </a:xfrm>
+          <a:prstGeom prst="rect">
+            <a:avLst/>
+          </a:prstGeom>
+          <a:ln>
+            <a:noFill/>
+          </a:ln>
+        </p:spPr>
+      </p:pic>
+      <p:sp>
+        <p:nvSpPr>
+          <p:cNvPr id="129" name="TextShape 2"/>
           <p:cNvSpPr txBox="1"/>
           <p:nvPr/>
         </p:nvSpPr>
         <p:spPr>
           <a:xfrm>
-            <a:off x="838080" y="1825560"/>
+            <a:off x="838440" y="1825560"/>
             <a:ext cx="10515240" cy="4350960"/>
           </a:xfrm>
           <a:prstGeom prst="rect">
@@ -7970,7 +7997,7 @@
               <a:buChar char="•"/>
             </a:pPr>
             <a:r>
-              <a:rPr lang="de-DE" sz="2800" b="0" strike="noStrike" spc="-1" dirty="0">
+              <a:rPr lang="de-DE" sz="2800" b="0" strike="noStrike" spc="-1">
                 <a:solidFill>
                   <a:srgbClr val="000000"/>
                 </a:solidFill>
@@ -7981,16 +8008,16 @@
                 </a:uFill>
                 <a:latin typeface="Calibri"/>
               </a:rPr>
-              <a:t>Methodik-Pipeline </a:t>
+              <a:t>Entfernung von Details</a:t>
             </a:r>
           </a:p>
           <a:p>
-            <a:pPr marL="685800" lvl="1" indent="-228240">
+            <a:pPr marL="228600" indent="-228240">
               <a:lnSpc>
-                <a:spcPct val="100000"/>
+                <a:spcPct val="90000"/>
               </a:lnSpc>
               <a:spcBef>
-                <a:spcPts val="499"/>
+                <a:spcPts val="1001"/>
               </a:spcBef>
               <a:buClr>
                 <a:srgbClr val="000000"/>
@@ -7999,7 +8026,7 @@
               <a:buChar char="•"/>
             </a:pPr>
             <a:r>
-              <a:rPr lang="de-DE" sz="2400" b="0" strike="noStrike" spc="-1" dirty="0">
+              <a:rPr lang="de-DE" sz="2800" b="0" strike="noStrike" spc="-1">
                 <a:solidFill>
                   <a:srgbClr val="000000"/>
                 </a:solidFill>
@@ -8010,16 +8037,16 @@
                 </a:uFill>
                 <a:latin typeface="Calibri"/>
               </a:rPr>
-              <a:t>1. Umwandlung in ein Binärbild - Threshold nach Otsu </a:t>
+              <a:t>(Vorarbeit für Raumerkennung)</a:t>
             </a:r>
           </a:p>
           <a:p>
-            <a:pPr marL="685800" lvl="1" indent="-228240">
+            <a:pPr marL="228600" indent="-228240">
               <a:lnSpc>
-                <a:spcPct val="100000"/>
+                <a:spcPct val="90000"/>
               </a:lnSpc>
               <a:spcBef>
-                <a:spcPts val="499"/>
+                <a:spcPts val="1001"/>
               </a:spcBef>
               <a:buClr>
                 <a:srgbClr val="000000"/>
@@ -8028,7 +8055,7 @@
               <a:buChar char="•"/>
             </a:pPr>
             <a:r>
-              <a:rPr lang="de-DE" sz="2400" b="0" strike="noStrike" spc="-1" dirty="0">
+              <a:rPr lang="de-DE" sz="2800" b="0" strike="noStrike" spc="-1">
                 <a:solidFill>
                   <a:srgbClr val="000000"/>
                 </a:solidFill>
@@ -8039,16 +8066,16 @@
                 </a:uFill>
                 <a:latin typeface="Calibri"/>
               </a:rPr>
-              <a:t>2. Entfernung von Details - Kantenfilter </a:t>
+              <a:t>Erste Versuche von Fenster-</a:t>
             </a:r>
           </a:p>
           <a:p>
-            <a:pPr marL="685800" lvl="1" indent="-228240">
+            <a:pPr marL="228600" indent="-228240">
               <a:lnSpc>
-                <a:spcPct val="100000"/>
+                <a:spcPct val="90000"/>
               </a:lnSpc>
               <a:spcBef>
-                <a:spcPts val="499"/>
+                <a:spcPts val="1001"/>
               </a:spcBef>
               <a:buClr>
                 <a:srgbClr val="000000"/>
@@ -8057,7 +8084,7 @@
               <a:buChar char="•"/>
             </a:pPr>
             <a:r>
-              <a:rPr lang="de-DE" sz="2400" b="0" strike="noStrike" spc="-1" dirty="0">
+              <a:rPr lang="de-DE" sz="2800" b="0" strike="noStrike" spc="-1">
                 <a:solidFill>
                   <a:srgbClr val="000000"/>
                 </a:solidFill>
@@ -8068,94 +8095,7 @@
                 </a:uFill>
                 <a:latin typeface="Calibri"/>
               </a:rPr>
-              <a:t>3. Flächenbestimmung - Distanztransformation </a:t>
-            </a:r>
-          </a:p>
-          <a:p>
-            <a:pPr marL="685800" lvl="1" indent="-228240">
-              <a:lnSpc>
-                <a:spcPct val="100000"/>
-              </a:lnSpc>
-              <a:spcBef>
-                <a:spcPts val="499"/>
-              </a:spcBef>
-              <a:buClr>
-                <a:srgbClr val="000000"/>
-              </a:buClr>
-              <a:buFont typeface="Arial"/>
-              <a:buChar char="•"/>
-            </a:pPr>
-            <a:r>
-              <a:rPr lang="de-DE" sz="2400" b="0" strike="noStrike" spc="-1" dirty="0">
-                <a:solidFill>
-                  <a:srgbClr val="000000"/>
-                </a:solidFill>
-                <a:uFill>
-                  <a:solidFill>
-                    <a:srgbClr val="FFFFFF"/>
-                  </a:solidFill>
-                </a:uFill>
-                <a:latin typeface="Calibri"/>
-              </a:rPr>
-              <a:t>4. Erkennung der Türen und Abtrennung der Räume - Hough-Transformation</a:t>
-            </a:r>
-          </a:p>
-          <a:p>
-            <a:pPr marL="685800" lvl="1" indent="-228240">
-              <a:lnSpc>
-                <a:spcPct val="100000"/>
-              </a:lnSpc>
-              <a:spcBef>
-                <a:spcPts val="499"/>
-              </a:spcBef>
-              <a:buClr>
-                <a:srgbClr val="000000"/>
-              </a:buClr>
-              <a:buFont typeface="Arial"/>
-              <a:buChar char="•"/>
-            </a:pPr>
-            <a:r>
-              <a:rPr lang="de-DE" sz="2400" b="0" strike="noStrike" spc="-1" dirty="0">
-                <a:solidFill>
-                  <a:srgbClr val="000000"/>
-                </a:solidFill>
-                <a:uFill>
-                  <a:solidFill>
-                    <a:srgbClr val="FFFFFF"/>
-                  </a:solidFill>
-                </a:uFill>
-                <a:latin typeface="Calibri"/>
-              </a:rPr>
-              <a:t>5. Erkennung der Fenster – Mathematische Morphologie </a:t>
-            </a:r>
-          </a:p>
-          <a:p>
-            <a:pPr marL="685800" lvl="1" indent="-228240">
-              <a:lnSpc>
-                <a:spcPct val="100000"/>
-              </a:lnSpc>
-              <a:spcBef>
-                <a:spcPts val="499"/>
-              </a:spcBef>
-              <a:buClr>
-                <a:srgbClr val="000000"/>
-              </a:buClr>
-              <a:buFont typeface="Arial"/>
-              <a:buChar char="•"/>
-            </a:pPr>
-            <a:r>
-              <a:rPr lang="de-DE" sz="2400" b="0" strike="noStrike" spc="-1" dirty="0">
-                <a:solidFill>
-                  <a:srgbClr val="000000"/>
-                </a:solidFill>
-                <a:uFill>
-                  <a:solidFill>
-                    <a:srgbClr val="FFFFFF"/>
-                  </a:solidFill>
-                </a:uFill>
-                <a:latin typeface="Calibri"/>
-              </a:rPr>
-              <a:t>6. Erkennung der Stiegen – Kantenfilter, Hough-Transformation</a:t>
+              <a:t> und Stiegen Erkennung</a:t>
             </a:r>
           </a:p>
         </p:txBody>
@@ -8214,7 +8154,7 @@
       </p:grpSpPr>
       <p:sp>
         <p:nvSpPr>
-          <p:cNvPr id="127" name="TextShape 1"/>
+          <p:cNvPr id="130" name="TextShape 1"/>
           <p:cNvSpPr txBox="1"/>
           <p:nvPr/>
         </p:nvSpPr>
@@ -8241,7 +8181,7 @@
               </a:lnSpc>
             </a:pPr>
             <a:r>
-              <a:rPr lang="de-DE" sz="4400" b="0" strike="noStrike" spc="-1">
+              <a:rPr lang="de-DE" sz="4400" b="0" strike="noStrike" spc="-1" dirty="0">
                 <a:solidFill>
                   <a:srgbClr val="000000"/>
                 </a:solidFill>
@@ -8252,54 +8192,31 @@
                 </a:uFill>
                 <a:latin typeface="Calibri Light"/>
               </a:rPr>
-              <a:t>Aktueller Stand</a:t>
+              <a:t>Probleme</a:t>
             </a:r>
-            <a:endParaRPr lang="de-DE" sz="4400" b="0" strike="noStrike" spc="-1">
-              <a:solidFill>
-                <a:srgbClr val="000000"/>
-              </a:solidFill>
-              <a:uFill>
-                <a:solidFill>
-                  <a:srgbClr val="FFFFFF"/>
-                </a:solidFill>
-              </a:uFill>
-              <a:latin typeface="Calibri"/>
-            </a:endParaRPr>
-          </a:p>
-        </p:txBody>
-      </p:sp>
-      <p:pic>
-        <p:nvPicPr>
-          <p:cNvPr id="128" name="Grafik 127"/>
-          <p:cNvPicPr/>
-          <p:nvPr/>
-        </p:nvPicPr>
-        <p:blipFill>
-          <a:blip r:embed="rId2"/>
-          <a:stretch/>
-        </p:blipFill>
-        <p:spPr>
-          <a:xfrm>
-            <a:off x="5212080" y="2960640"/>
-            <a:ext cx="6583680" cy="3440160"/>
-          </a:xfrm>
-          <a:prstGeom prst="rect">
-            <a:avLst/>
-          </a:prstGeom>
-          <a:ln>
-            <a:noFill/>
-          </a:ln>
-        </p:spPr>
-      </p:pic>
-      <p:sp>
-        <p:nvSpPr>
-          <p:cNvPr id="129" name="TextShape 2"/>
+            <a:endParaRPr lang="de-DE" sz="4400" b="0" strike="noStrike" spc="-1" dirty="0">
+              <a:solidFill>
+                <a:srgbClr val="000000"/>
+              </a:solidFill>
+              <a:uFill>
+                <a:solidFill>
+                  <a:srgbClr val="FFFFFF"/>
+                </a:solidFill>
+              </a:uFill>
+              <a:latin typeface="Calibri"/>
+            </a:endParaRPr>
+          </a:p>
+        </p:txBody>
+      </p:sp>
+      <p:sp>
+        <p:nvSpPr>
+          <p:cNvPr id="131" name="TextShape 2"/>
           <p:cNvSpPr txBox="1"/>
           <p:nvPr/>
         </p:nvSpPr>
         <p:spPr>
           <a:xfrm>
-            <a:off x="838440" y="1825560"/>
+            <a:off x="838080" y="1825560"/>
             <a:ext cx="10515240" cy="4350960"/>
           </a:xfrm>
           <a:prstGeom prst="rect">
@@ -8328,7 +8245,7 @@
               <a:buChar char="•"/>
             </a:pPr>
             <a:r>
-              <a:rPr lang="de-DE" sz="2800" b="0" strike="noStrike" spc="-1">
+              <a:rPr lang="de-DE" sz="2800" b="0" strike="noStrike" spc="-1" dirty="0">
                 <a:solidFill>
                   <a:srgbClr val="000000"/>
                 </a:solidFill>
@@ -8339,8 +8256,126 @@
                 </a:uFill>
                 <a:latin typeface="Calibri"/>
               </a:rPr>
-              <a:t>Entfernung von Details</a:t>
+              <a:t>Fenster</a:t>
             </a:r>
+          </a:p>
+          <a:p>
+            <a:pPr marL="864000" lvl="1" indent="-324000">
+              <a:spcBef>
+                <a:spcPts val="1134"/>
+              </a:spcBef>
+              <a:buClr>
+                <a:srgbClr val="000000"/>
+              </a:buClr>
+              <a:buSzPct val="75000"/>
+              <a:buFont typeface="Symbol" charset="2"/>
+              <a:buChar char=""/>
+            </a:pPr>
+            <a:r>
+              <a:rPr lang="de-DE" sz="2800" b="0" strike="noStrike" spc="-1" dirty="0">
+                <a:solidFill>
+                  <a:srgbClr val="000000"/>
+                </a:solidFill>
+                <a:uFill>
+                  <a:solidFill>
+                    <a:srgbClr val="FFFFFF"/>
+                  </a:solidFill>
+                </a:uFill>
+                <a:latin typeface="Calibri"/>
+              </a:rPr>
+              <a:t>Hit </a:t>
+            </a:r>
+            <a:r>
+              <a:rPr lang="de-DE" sz="2800" b="0" strike="noStrike" spc="-1" dirty="0" err="1">
+                <a:solidFill>
+                  <a:srgbClr val="000000"/>
+                </a:solidFill>
+                <a:uFill>
+                  <a:solidFill>
+                    <a:srgbClr val="FFFFFF"/>
+                  </a:solidFill>
+                </a:uFill>
+                <a:latin typeface="Calibri"/>
+              </a:rPr>
+              <a:t>or</a:t>
+            </a:r>
+            <a:r>
+              <a:rPr lang="de-DE" sz="2800" b="0" strike="noStrike" spc="-1" dirty="0">
+                <a:solidFill>
+                  <a:srgbClr val="000000"/>
+                </a:solidFill>
+                <a:uFill>
+                  <a:solidFill>
+                    <a:srgbClr val="FFFFFF"/>
+                  </a:solidFill>
+                </a:uFill>
+                <a:latin typeface="Calibri"/>
+              </a:rPr>
+              <a:t> Miss Transformation nicht akkurat genug.</a:t>
+            </a:r>
+          </a:p>
+          <a:p>
+            <a:pPr marL="864000" lvl="1" indent="-324000">
+              <a:spcBef>
+                <a:spcPts val="1134"/>
+              </a:spcBef>
+              <a:buClr>
+                <a:srgbClr val="000000"/>
+              </a:buClr>
+              <a:buSzPct val="75000"/>
+              <a:buFont typeface="Symbol" charset="2"/>
+              <a:buChar char=""/>
+            </a:pPr>
+            <a:r>
+              <a:rPr lang="de-DE" sz="2800" b="0" strike="noStrike" spc="-1" dirty="0">
+                <a:solidFill>
+                  <a:srgbClr val="000000"/>
+                </a:solidFill>
+                <a:uFill>
+                  <a:solidFill>
+                    <a:srgbClr val="FFFFFF"/>
+                  </a:solidFill>
+                </a:uFill>
+                <a:latin typeface="Calibri"/>
+              </a:rPr>
+              <a:t>Fenster besitzen leicht unterschiedliche Größen</a:t>
+            </a:r>
+            <a:r>
+              <a:rPr lang="de-DE" sz="2800" spc="-1" dirty="0">
+                <a:solidFill>
+                  <a:srgbClr val="000000"/>
+                </a:solidFill>
+                <a:uFill>
+                  <a:solidFill>
+                    <a:srgbClr val="FFFFFF"/>
+                  </a:solidFill>
+                </a:uFill>
+                <a:latin typeface="Calibri"/>
+              </a:rPr>
+              <a:t>.</a:t>
+            </a:r>
+          </a:p>
+          <a:p>
+            <a:pPr marL="540000" lvl="1">
+              <a:spcBef>
+                <a:spcPts val="1134"/>
+              </a:spcBef>
+              <a:buClr>
+                <a:srgbClr val="000000"/>
+              </a:buClr>
+              <a:buSzPct val="75000"/>
+            </a:pPr>
+            <a:endParaRPr lang="de-DE" sz="2800" b="0" strike="noStrike" spc="-1" dirty="0">
+              <a:solidFill>
+                <a:srgbClr val="000000"/>
+              </a:solidFill>
+              <a:uFill>
+                <a:solidFill>
+                  <a:srgbClr val="FFFFFF"/>
+                </a:solidFill>
+              </a:uFill>
+              <a:latin typeface="Calibri"/>
+            </a:endParaRPr>
           </a:p>
           <a:p>
             <a:pPr marL="228600" indent="-228240">
@@ -8357,7 +8392,7 @@
               <a:buChar char="•"/>
             </a:pPr>
             <a:r>
-              <a:rPr lang="de-DE" sz="2800" b="0" strike="noStrike" spc="-1">
+              <a:rPr lang="de-DE" sz="2800" b="0" strike="noStrike" spc="-1" dirty="0">
                 <a:solidFill>
                   <a:srgbClr val="000000"/>
                 </a:solidFill>
@@ -8368,11 +8403,11 @@
                 </a:uFill>
                 <a:latin typeface="Calibri"/>
               </a:rPr>
-              <a:t>(Vorarbeit für Raumerkennung)</a:t>
+              <a:t>Stiegen</a:t>
             </a:r>
           </a:p>
           <a:p>
-            <a:pPr marL="228600" indent="-228240">
+            <a:pPr marL="360">
               <a:lnSpc>
                 <a:spcPct val="90000"/>
               </a:lnSpc>
@@ -8382,11 +8417,9 @@
               <a:buClr>
                 <a:srgbClr val="000000"/>
               </a:buClr>
-              <a:buFont typeface="Arial"/>
-              <a:buChar char="•"/>
             </a:pPr>
             <a:r>
-              <a:rPr lang="de-DE" sz="2800" b="0" strike="noStrike" spc="-1">
+              <a:rPr lang="de-DE" sz="2800" spc="-1" dirty="0">
                 <a:solidFill>
                   <a:srgbClr val="000000"/>
                 </a:solidFill>
@@ -8397,11 +8430,22 @@
                 </a:uFill>
                 <a:latin typeface="Calibri"/>
               </a:rPr>
-              <a:t>Erste Versuche von Fenster-</a:t>
+              <a:t>	siehe nächste Folie</a:t>
             </a:r>
-          </a:p>
-          <a:p>
-            <a:pPr marL="228600" indent="-228240">
+            <a:endParaRPr lang="de-DE" sz="2800" b="0" strike="noStrike" spc="-1" dirty="0">
+              <a:solidFill>
+                <a:srgbClr val="000000"/>
+              </a:solidFill>
+              <a:uFill>
+                <a:solidFill>
+                  <a:srgbClr val="FFFFFF"/>
+                </a:solidFill>
+              </a:uFill>
+              <a:latin typeface="Calibri"/>
+            </a:endParaRPr>
+          </a:p>
+          <a:p>
+            <a:pPr marL="360">
               <a:lnSpc>
                 <a:spcPct val="90000"/>
               </a:lnSpc>
@@ -8411,23 +8455,18 @@
               <a:buClr>
                 <a:srgbClr val="000000"/>
               </a:buClr>
-              <a:buFont typeface="Arial"/>
-              <a:buChar char="•"/>
             </a:pPr>
-            <a:r>
-              <a:rPr lang="de-DE" sz="2800" b="0" strike="noStrike" spc="-1">
-                <a:solidFill>
-                  <a:srgbClr val="000000"/>
-                </a:solidFill>
-                <a:uFill>
-                  <a:solidFill>
-                    <a:srgbClr val="FFFFFF"/>
-                  </a:solidFill>
-                </a:uFill>
-                <a:latin typeface="Calibri"/>
-              </a:rPr>
-              <a:t> und Stiegen Erkennung</a:t>
-            </a:r>
+            <a:endParaRPr lang="de-DE" sz="2800" b="0" strike="noStrike" spc="-1" dirty="0">
+              <a:solidFill>
+                <a:srgbClr val="000000"/>
+              </a:solidFill>
+              <a:uFill>
+                <a:solidFill>
+                  <a:srgbClr val="FFFFFF"/>
+                </a:solidFill>
+              </a:uFill>
+              <a:latin typeface="Calibri"/>
+            </a:endParaRPr>
           </a:p>
         </p:txBody>
       </p:sp>
@@ -8467,376 +8506,6 @@
 </file>
 
 <file path=ppt/slides/slide6.xml><?xml version="1.0" encoding="utf-8"?>
-<p:sld xmlns:a="http://schemas.openxmlformats.org/drawingml/2006/main" xmlns:r="http://schemas.openxmlformats.org/officeDocument/2006/relationships" xmlns:p="http://schemas.openxmlformats.org/presentationml/2006/main">
-  <p:cSld>
-    <p:spTree>
-      <p:nvGrpSpPr>
-        <p:cNvPr id="1" name=""/>
-        <p:cNvGrpSpPr/>
-        <p:nvPr/>
-      </p:nvGrpSpPr>
-      <p:grpSpPr>
-        <a:xfrm>
-          <a:off x="0" y="0"/>
-          <a:ext cx="0" cy="0"/>
-          <a:chOff x="0" y="0"/>
-          <a:chExt cx="0" cy="0"/>
-        </a:xfrm>
-      </p:grpSpPr>
-      <p:sp>
-        <p:nvSpPr>
-          <p:cNvPr id="130" name="TextShape 1"/>
-          <p:cNvSpPr txBox="1"/>
-          <p:nvPr/>
-        </p:nvSpPr>
-        <p:spPr>
-          <a:xfrm>
-            <a:off x="838080" y="365040"/>
-            <a:ext cx="10515240" cy="1325160"/>
-          </a:xfrm>
-          <a:prstGeom prst="rect">
-            <a:avLst/>
-          </a:prstGeom>
-          <a:noFill/>
-          <a:ln>
-            <a:noFill/>
-          </a:ln>
-        </p:spPr>
-        <p:txBody>
-          <a:bodyPr anchor="ctr"/>
-          <a:lstStyle/>
-          <a:p>
-            <a:pPr>
-              <a:lnSpc>
-                <a:spcPct val="90000"/>
-              </a:lnSpc>
-            </a:pPr>
-            <a:r>
-              <a:rPr lang="de-DE" sz="4400" b="0" strike="noStrike" spc="-1" dirty="0">
-                <a:solidFill>
-                  <a:srgbClr val="000000"/>
-                </a:solidFill>
-                <a:uFill>
-                  <a:solidFill>
-                    <a:srgbClr val="FFFFFF"/>
-                  </a:solidFill>
-                </a:uFill>
-                <a:latin typeface="Calibri Light"/>
-              </a:rPr>
-              <a:t>Probleme</a:t>
-            </a:r>
-            <a:endParaRPr lang="de-DE" sz="4400" b="0" strike="noStrike" spc="-1" dirty="0">
-              <a:solidFill>
-                <a:srgbClr val="000000"/>
-              </a:solidFill>
-              <a:uFill>
-                <a:solidFill>
-                  <a:srgbClr val="FFFFFF"/>
-                </a:solidFill>
-              </a:uFill>
-              <a:latin typeface="Calibri"/>
-            </a:endParaRPr>
-          </a:p>
-        </p:txBody>
-      </p:sp>
-      <p:sp>
-        <p:nvSpPr>
-          <p:cNvPr id="131" name="TextShape 2"/>
-          <p:cNvSpPr txBox="1"/>
-          <p:nvPr/>
-        </p:nvSpPr>
-        <p:spPr>
-          <a:xfrm>
-            <a:off x="838080" y="1825560"/>
-            <a:ext cx="10515240" cy="4350960"/>
-          </a:xfrm>
-          <a:prstGeom prst="rect">
-            <a:avLst/>
-          </a:prstGeom>
-          <a:noFill/>
-          <a:ln>
-            <a:noFill/>
-          </a:ln>
-        </p:spPr>
-        <p:txBody>
-          <a:bodyPr/>
-          <a:lstStyle/>
-          <a:p>
-            <a:pPr marL="228600" indent="-228240">
-              <a:lnSpc>
-                <a:spcPct val="90000"/>
-              </a:lnSpc>
-              <a:spcBef>
-                <a:spcPts val="1001"/>
-              </a:spcBef>
-              <a:buClr>
-                <a:srgbClr val="000000"/>
-              </a:buClr>
-              <a:buFont typeface="Arial"/>
-              <a:buChar char="•"/>
-            </a:pPr>
-            <a:r>
-              <a:rPr lang="de-DE" sz="2800" b="0" strike="noStrike" spc="-1" dirty="0">
-                <a:solidFill>
-                  <a:srgbClr val="000000"/>
-                </a:solidFill>
-                <a:uFill>
-                  <a:solidFill>
-                    <a:srgbClr val="FFFFFF"/>
-                  </a:solidFill>
-                </a:uFill>
-                <a:latin typeface="Calibri"/>
-              </a:rPr>
-              <a:t>Fenster</a:t>
-            </a:r>
-          </a:p>
-          <a:p>
-            <a:pPr marL="864000" lvl="1" indent="-324000">
-              <a:spcBef>
-                <a:spcPts val="1134"/>
-              </a:spcBef>
-              <a:buClr>
-                <a:srgbClr val="000000"/>
-              </a:buClr>
-              <a:buSzPct val="75000"/>
-              <a:buFont typeface="Symbol" charset="2"/>
-              <a:buChar char=""/>
-            </a:pPr>
-            <a:r>
-              <a:rPr lang="de-DE" sz="2800" b="0" strike="noStrike" spc="-1" dirty="0">
-                <a:solidFill>
-                  <a:srgbClr val="000000"/>
-                </a:solidFill>
-                <a:uFill>
-                  <a:solidFill>
-                    <a:srgbClr val="FFFFFF"/>
-                  </a:solidFill>
-                </a:uFill>
-                <a:latin typeface="Calibri"/>
-              </a:rPr>
-              <a:t>Hit </a:t>
-            </a:r>
-            <a:r>
-              <a:rPr lang="de-DE" sz="2800" b="0" strike="noStrike" spc="-1" dirty="0" err="1">
-                <a:solidFill>
-                  <a:srgbClr val="000000"/>
-                </a:solidFill>
-                <a:uFill>
-                  <a:solidFill>
-                    <a:srgbClr val="FFFFFF"/>
-                  </a:solidFill>
-                </a:uFill>
-                <a:latin typeface="Calibri"/>
-              </a:rPr>
-              <a:t>or</a:t>
-            </a:r>
-            <a:r>
-              <a:rPr lang="de-DE" sz="2800" b="0" strike="noStrike" spc="-1" dirty="0">
-                <a:solidFill>
-                  <a:srgbClr val="000000"/>
-                </a:solidFill>
-                <a:uFill>
-                  <a:solidFill>
-                    <a:srgbClr val="FFFFFF"/>
-                  </a:solidFill>
-                </a:uFill>
-                <a:latin typeface="Calibri"/>
-              </a:rPr>
-              <a:t> Miss Transformation nicht akkurat genug.</a:t>
-            </a:r>
-          </a:p>
-          <a:p>
-            <a:pPr marL="864000" lvl="1" indent="-324000">
-              <a:spcBef>
-                <a:spcPts val="1134"/>
-              </a:spcBef>
-              <a:buClr>
-                <a:srgbClr val="000000"/>
-              </a:buClr>
-              <a:buSzPct val="75000"/>
-              <a:buFont typeface="Symbol" charset="2"/>
-              <a:buChar char=""/>
-            </a:pPr>
-            <a:r>
-              <a:rPr lang="de-DE" sz="2800" b="0" strike="noStrike" spc="-1" dirty="0">
-                <a:solidFill>
-                  <a:srgbClr val="000000"/>
-                </a:solidFill>
-                <a:uFill>
-                  <a:solidFill>
-                    <a:srgbClr val="FFFFFF"/>
-                  </a:solidFill>
-                </a:uFill>
-                <a:latin typeface="Calibri"/>
-              </a:rPr>
-              <a:t>Fenster besitzen leicht unterschiedliche Größen</a:t>
-            </a:r>
-            <a:r>
-              <a:rPr lang="de-DE" sz="2800" spc="-1" dirty="0">
-                <a:solidFill>
-                  <a:srgbClr val="000000"/>
-                </a:solidFill>
-                <a:uFill>
-                  <a:solidFill>
-                    <a:srgbClr val="FFFFFF"/>
-                  </a:solidFill>
-                </a:uFill>
-                <a:latin typeface="Calibri"/>
-              </a:rPr>
-              <a:t>.</a:t>
-            </a:r>
-          </a:p>
-          <a:p>
-            <a:pPr marL="540000" lvl="1">
-              <a:spcBef>
-                <a:spcPts val="1134"/>
-              </a:spcBef>
-              <a:buClr>
-                <a:srgbClr val="000000"/>
-              </a:buClr>
-              <a:buSzPct val="75000"/>
-            </a:pPr>
-            <a:endParaRPr lang="de-DE" sz="2800" b="0" strike="noStrike" spc="-1" dirty="0">
-              <a:solidFill>
-                <a:srgbClr val="000000"/>
-              </a:solidFill>
-              <a:uFill>
-                <a:solidFill>
-                  <a:srgbClr val="FFFFFF"/>
-                </a:solidFill>
-              </a:uFill>
-              <a:latin typeface="Calibri"/>
-            </a:endParaRPr>
-          </a:p>
-          <a:p>
-            <a:pPr marL="228600" indent="-228240">
-              <a:lnSpc>
-                <a:spcPct val="90000"/>
-              </a:lnSpc>
-              <a:spcBef>
-                <a:spcPts val="1001"/>
-              </a:spcBef>
-              <a:buClr>
-                <a:srgbClr val="000000"/>
-              </a:buClr>
-              <a:buFont typeface="Arial"/>
-              <a:buChar char="•"/>
-            </a:pPr>
-            <a:r>
-              <a:rPr lang="de-DE" sz="2800" b="0" strike="noStrike" spc="-1" dirty="0">
-                <a:solidFill>
-                  <a:srgbClr val="000000"/>
-                </a:solidFill>
-                <a:uFill>
-                  <a:solidFill>
-                    <a:srgbClr val="FFFFFF"/>
-                  </a:solidFill>
-                </a:uFill>
-                <a:latin typeface="Calibri"/>
-              </a:rPr>
-              <a:t>Stiegen</a:t>
-            </a:r>
-          </a:p>
-          <a:p>
-            <a:pPr marL="360">
-              <a:lnSpc>
-                <a:spcPct val="90000"/>
-              </a:lnSpc>
-              <a:spcBef>
-                <a:spcPts val="1001"/>
-              </a:spcBef>
-              <a:buClr>
-                <a:srgbClr val="000000"/>
-              </a:buClr>
-            </a:pPr>
-            <a:r>
-              <a:rPr lang="de-DE" sz="2800" spc="-1" dirty="0">
-                <a:solidFill>
-                  <a:srgbClr val="000000"/>
-                </a:solidFill>
-                <a:uFill>
-                  <a:solidFill>
-                    <a:srgbClr val="FFFFFF"/>
-                  </a:solidFill>
-                </a:uFill>
-                <a:latin typeface="Calibri"/>
-              </a:rPr>
-              <a:t>	siehe nächste Folie</a:t>
-            </a:r>
-            <a:endParaRPr lang="de-DE" sz="2800" b="0" strike="noStrike" spc="-1" dirty="0">
-              <a:solidFill>
-                <a:srgbClr val="000000"/>
-              </a:solidFill>
-              <a:uFill>
-                <a:solidFill>
-                  <a:srgbClr val="FFFFFF"/>
-                </a:solidFill>
-              </a:uFill>
-              <a:latin typeface="Calibri"/>
-            </a:endParaRPr>
-          </a:p>
-          <a:p>
-            <a:pPr marL="360">
-              <a:lnSpc>
-                <a:spcPct val="90000"/>
-              </a:lnSpc>
-              <a:spcBef>
-                <a:spcPts val="1001"/>
-              </a:spcBef>
-              <a:buClr>
-                <a:srgbClr val="000000"/>
-              </a:buClr>
-            </a:pPr>
-            <a:endParaRPr lang="de-DE" sz="2800" b="0" strike="noStrike" spc="-1" dirty="0">
-              <a:solidFill>
-                <a:srgbClr val="000000"/>
-              </a:solidFill>
-              <a:uFill>
-                <a:solidFill>
-                  <a:srgbClr val="FFFFFF"/>
-                </a:solidFill>
-              </a:uFill>
-              <a:latin typeface="Calibri"/>
-            </a:endParaRPr>
-          </a:p>
-        </p:txBody>
-      </p:sp>
-    </p:spTree>
-  </p:cSld>
-  <p:clrMapOvr>
-    <a:masterClrMapping/>
-  </p:clrMapOvr>
-  <p:timing>
-    <p:tnLst>
-      <p:par>
-        <p:cTn id="1" dur="indefinite" restart="never" nodeType="tmRoot">
-          <p:childTnLst>
-            <p:seq>
-              <p:cTn id="2" nodeType="mainSeq"/>
-              <p:prevCondLst>
-                <p:cond evt="onPrev" delay="0">
-                  <p:tgtEl>
-                    <p:sldTgt/>
-                  </p:tgtEl>
-                </p:cond>
-              </p:prevCondLst>
-              <p:nextCondLst>
-                <p:cond evt="onNext" delay="0">
-                  <p:tgtEl>
-                    <p:sldTgt/>
-                  </p:tgtEl>
-                </p:cond>
-              </p:nextCondLst>
-            </p:seq>
-          </p:childTnLst>
-        </p:cTn>
-      </p:par>
-    </p:tnLst>
-  </p:timing>
-</p:sld>
-</file>
-
-<file path=ppt/slides/slide7.xml><?xml version="1.0" encoding="utf-8"?>
 <p:sld xmlns:a="http://schemas.openxmlformats.org/drawingml/2006/main" xmlns:r="http://schemas.openxmlformats.org/officeDocument/2006/relationships" xmlns:p="http://schemas.openxmlformats.org/presentationml/2006/main">
   <p:cSld>
     <p:spTree>

</xml_diff>